<commit_message>
Create weekly demographic report function
</commit_message>
<xml_diff>
--- a/inst/extdata/covid_report_template.pptx
+++ b/inst/extdata/covid_report_template.pptx
@@ -3167,8 +3167,8 @@
         </p:nvSpPr>
         <p:spPr>
           <a:xfrm>
-            <a:off x="609596" y="1600205"/>
-            <a:ext cx="5440680" cy="4419595"/>
+            <a:off x="381000" y="1600205"/>
+            <a:ext cx="5669276" cy="4419595"/>
           </a:xfrm>
         </p:spPr>
         <p:txBody>
@@ -3206,7 +3206,7 @@
         <p:spPr>
           <a:xfrm>
             <a:off x="6141726" y="1600204"/>
-            <a:ext cx="5440680" cy="4419595"/>
+            <a:ext cx="5669274" cy="4419595"/>
           </a:xfrm>
         </p:spPr>
         <p:txBody>

</xml_diff>